<commit_message>
Added the list of videos as a slide at the end of the deck; fixed a typo in a slide.
</commit_message>
<xml_diff>
--- a/slides/Robots.SeattleCodeCamp2016.pptx
+++ b/slides/Robots.SeattleCodeCamp2016.pptx
@@ -36,6 +36,7 @@
     <p:sldId id="305" r:id="rId30"/>
     <p:sldId id="306" r:id="rId31"/>
     <p:sldId id="258" r:id="rId32"/>
+    <p:sldId id="307" r:id="rId33"/>
   </p:sldIdLst>
   <p:sldSz cx="12192000" cy="6858000"/>
   <p:notesSz cx="6858000" cy="9144000"/>
@@ -338,7 +339,7 @@
           <a:p>
             <a:fld id="{ECD19FB2-3AAB-4D03-B13A-2960828C78E3}" type="datetimeFigureOut">
               <a:rPr lang="en-US" dirty="0"/>
-              <a:t>9/10/2016</a:t>
+              <a:t>9/17/2016</a:t>
             </a:fld>
             <a:endParaRPr lang="en-US" dirty="0"/>
           </a:p>
@@ -619,7 +620,7 @@
           <a:p>
             <a:fld id="{1B80C674-7DFC-42FE-B9CD-82963CDB1557}" type="datetimeFigureOut">
               <a:rPr lang="en-US" dirty="0"/>
-              <a:t>9/10/2016</a:t>
+              <a:t>9/17/2016</a:t>
             </a:fld>
             <a:endParaRPr lang="en-US" dirty="0"/>
           </a:p>
@@ -810,7 +811,7 @@
           <a:p>
             <a:fld id="{2076456F-F47D-4F25-8053-2A695DA0CA7D}" type="datetimeFigureOut">
               <a:rPr lang="en-US" dirty="0"/>
-              <a:t>9/10/2016</a:t>
+              <a:t>9/17/2016</a:t>
             </a:fld>
             <a:endParaRPr lang="en-US" dirty="0"/>
           </a:p>
@@ -1070,7 +1071,7 @@
           <a:p>
             <a:fld id="{5D6C7379-69CC-4837-9905-BEBA22830C8A}" type="datetimeFigureOut">
               <a:rPr lang="en-US" dirty="0"/>
-              <a:t>9/10/2016</a:t>
+              <a:t>9/17/2016</a:t>
             </a:fld>
             <a:endParaRPr lang="en-US" dirty="0"/>
           </a:p>
@@ -1495,7 +1496,7 @@
           <a:p>
             <a:fld id="{49EB8B7E-8AEE-4F10-BFEE-C999AD004D36}" type="datetimeFigureOut">
               <a:rPr lang="en-US" dirty="0"/>
-              <a:t>9/10/2016</a:t>
+              <a:t>9/17/2016</a:t>
             </a:fld>
             <a:endParaRPr lang="en-US" dirty="0"/>
           </a:p>
@@ -2040,7 +2041,7 @@
           <a:p>
             <a:fld id="{8668F3F9-58BC-440B-B37B-805B9055EF92}" type="datetimeFigureOut">
               <a:rPr lang="en-US" dirty="0"/>
-              <a:t>9/10/2016</a:t>
+              <a:t>9/17/2016</a:t>
             </a:fld>
             <a:endParaRPr lang="en-US" dirty="0"/>
           </a:p>
@@ -2870,7 +2871,7 @@
           <a:p>
             <a:fld id="{0D5A53AF-48EA-489D-8260-9DCAB666386A}" type="datetimeFigureOut">
               <a:rPr lang="en-US" dirty="0"/>
-              <a:t>9/10/2016</a:t>
+              <a:t>9/17/2016</a:t>
             </a:fld>
             <a:endParaRPr lang="en-US" dirty="0"/>
           </a:p>
@@ -3039,7 +3040,7 @@
           <a:p>
             <a:fld id="{0DED02AE-B9A4-47BD-AF8E-97E16144138B}" type="datetimeFigureOut">
               <a:rPr lang="en-US" dirty="0"/>
-              <a:t>9/10/2016</a:t>
+              <a:t>9/17/2016</a:t>
             </a:fld>
             <a:endParaRPr lang="en-US" dirty="0"/>
           </a:p>
@@ -3218,7 +3219,7 @@
           <a:p>
             <a:fld id="{CF0FD78B-DB02-4362-BCDC-98A55456977C}" type="datetimeFigureOut">
               <a:rPr lang="en-US" dirty="0"/>
-              <a:t>9/10/2016</a:t>
+              <a:t>9/17/2016</a:t>
             </a:fld>
             <a:endParaRPr lang="en-US" dirty="0"/>
           </a:p>
@@ -3387,7 +3388,7 @@
           <a:p>
             <a:fld id="{99916976-5D93-46E4-A98A-FAD63E4D0EA8}" type="datetimeFigureOut">
               <a:rPr lang="en-US" dirty="0"/>
-              <a:t>9/10/2016</a:t>
+              <a:t>9/17/2016</a:t>
             </a:fld>
             <a:endParaRPr lang="en-US" dirty="0"/>
           </a:p>
@@ -3643,7 +3644,7 @@
           <a:p>
             <a:fld id="{0F39F4F5-F4D2-4D2A-AB60-88D37ADCB869}" type="datetimeFigureOut">
               <a:rPr lang="en-US" dirty="0"/>
-              <a:t>9/10/2016</a:t>
+              <a:t>9/17/2016</a:t>
             </a:fld>
             <a:endParaRPr lang="en-US" dirty="0"/>
           </a:p>
@@ -3874,7 +3875,7 @@
           <a:p>
             <a:fld id="{D23BC6CE-6D1E-47E5-8859-F31AC5380EB2}" type="datetimeFigureOut">
               <a:rPr lang="en-US" dirty="0"/>
-              <a:t>9/10/2016</a:t>
+              <a:t>9/17/2016</a:t>
             </a:fld>
             <a:endParaRPr lang="en-US" dirty="0"/>
           </a:p>
@@ -4266,7 +4267,7 @@
           <a:p>
             <a:fld id="{B1B4E7C4-4DA4-404D-9965-B13F2DD7D8BF}" type="datetimeFigureOut">
               <a:rPr lang="en-US" dirty="0"/>
-              <a:t>9/10/2016</a:t>
+              <a:t>9/17/2016</a:t>
             </a:fld>
             <a:endParaRPr lang="en-US" dirty="0"/>
           </a:p>
@@ -4383,7 +4384,7 @@
           <a:p>
             <a:fld id="{476FB7AA-4A53-424F-AD41-70827B6504BA}" type="datetimeFigureOut">
               <a:rPr lang="en-US" dirty="0"/>
-              <a:t>9/10/2016</a:t>
+              <a:t>9/17/2016</a:t>
             </a:fld>
             <a:endParaRPr lang="en-US" dirty="0"/>
           </a:p>
@@ -4477,7 +4478,7 @@
           <a:p>
             <a:fld id="{E7884882-FB12-4BC8-9960-9AD8104D7FAE}" type="datetimeFigureOut">
               <a:rPr lang="en-US" dirty="0"/>
-              <a:t>9/10/2016</a:t>
+              <a:t>9/17/2016</a:t>
             </a:fld>
             <a:endParaRPr lang="en-US" dirty="0"/>
           </a:p>
@@ -4749,7 +4750,7 @@
           <a:p>
             <a:fld id="{F7D1BD23-6E54-4D9D-AD88-A2813C73CC25}" type="datetimeFigureOut">
               <a:rPr lang="en-US" dirty="0"/>
-              <a:t>9/10/2016</a:t>
+              <a:t>9/17/2016</a:t>
             </a:fld>
             <a:endParaRPr lang="en-US" dirty="0"/>
           </a:p>
@@ -5029,7 +5030,7 @@
           <a:p>
             <a:fld id="{1471A834-4F3C-4AF9-9C74-05EC35A0F292}" type="datetimeFigureOut">
               <a:rPr lang="en-US" dirty="0"/>
-              <a:t>9/10/2016</a:t>
+              <a:t>9/17/2016</a:t>
             </a:fld>
             <a:endParaRPr lang="en-US" dirty="0"/>
           </a:p>
@@ -5268,7 +5269,7 @@
           <a:p>
             <a:fld id="{51CF1133-3259-4C45-BABA-5B62D9C6F78D}" type="datetimeFigureOut">
               <a:rPr lang="en-US" dirty="0"/>
-              <a:t>9/10/2016</a:t>
+              <a:t>9/17/2016</a:t>
             </a:fld>
             <a:endParaRPr lang="en-US" dirty="0"/>
           </a:p>
@@ -8165,15 +8166,7 @@
           <a:p>
             <a:r>
               <a:rPr lang="en-US" dirty="0" smtClean="0"/>
-              <a:t>“Dad</a:t>
-            </a:r>
-            <a:r>
-              <a:rPr lang="en-US" dirty="0" smtClean="0"/>
-              <a:t>, when are you going to the hardware store next</a:t>
-            </a:r>
-            <a:r>
-              <a:rPr lang="en-US" dirty="0" smtClean="0"/>
-              <a:t>?”</a:t>
+              <a:t>“Dad, when are you going to the hardware store next?”</a:t>
             </a:r>
             <a:endParaRPr lang="en-US" dirty="0"/>
           </a:p>
@@ -8287,8 +8280,16 @@
           <a:lstStyle/>
           <a:p>
             <a:r>
-              <a:rPr lang="en-US" dirty="0" smtClean="0"/>
-              <a:t>The FRC 2016-2017 Unveiling: Three Hours Ago</a:t>
+              <a:rPr lang="en-US" smtClean="0"/>
+              <a:t>The </a:t>
+            </a:r>
+            <a:r>
+              <a:rPr lang="en-US" smtClean="0"/>
+              <a:t>FTC </a:t>
+            </a:r>
+            <a:r>
+              <a:rPr lang="en-US" dirty="0" smtClean="0"/>
+              <a:t>2016-2017 Unveiling: Three Hours Ago</a:t>
             </a:r>
           </a:p>
         </p:txBody>
@@ -8459,6 +8460,190 @@
       </p:par>
     </p:tnLst>
   </p:timing>
+</p:sld>
+</file>
+
+<file path=ppt/slides/slide32.xml><?xml version="1.0" encoding="utf-8"?>
+<p:sld xmlns:a="http://schemas.openxmlformats.org/drawingml/2006/main" xmlns:r="http://schemas.openxmlformats.org/officeDocument/2006/relationships" xmlns:p="http://schemas.openxmlformats.org/presentationml/2006/main">
+  <p:cSld>
+    <p:spTree>
+      <p:nvGrpSpPr>
+        <p:cNvPr id="1" name=""/>
+        <p:cNvGrpSpPr/>
+        <p:nvPr/>
+      </p:nvGrpSpPr>
+      <p:grpSpPr>
+        <a:xfrm>
+          <a:off x="0" y="0"/>
+          <a:ext cx="0" cy="0"/>
+          <a:chOff x="0" y="0"/>
+          <a:chExt cx="0" cy="0"/>
+        </a:xfrm>
+      </p:grpSpPr>
+      <p:sp>
+        <p:nvSpPr>
+          <p:cNvPr id="3" name="Text Placeholder 2"/>
+          <p:cNvSpPr>
+            <a:spLocks noGrp="1"/>
+          </p:cNvSpPr>
+          <p:nvPr>
+            <p:ph type="body" sz="half" idx="2"/>
+          </p:nvPr>
+        </p:nvSpPr>
+        <p:spPr>
+          <a:xfrm>
+            <a:off x="839788" y="508000"/>
+            <a:ext cx="10514012" cy="5483225"/>
+          </a:xfrm>
+        </p:spPr>
+        <p:txBody>
+          <a:bodyPr/>
+          <a:lstStyle/>
+          <a:p>
+            <a:r>
+              <a:rPr lang="en-US" dirty="0" smtClean="0"/>
+              <a:t>The videos that I bookmarked for my talk are listed below. The first one is the one that I played at Slide #8. I had intended to play the remaining slides at  Slide #21, but didn’t because of time. Still, I thought I’d include the full list because there’s some other fun stuff there.</a:t>
+            </a:r>
+          </a:p>
+          <a:p>
+            <a:endParaRPr lang="en-US" dirty="0"/>
+          </a:p>
+          <a:p>
+            <a:r>
+              <a:rPr lang="en-US" dirty="0" smtClean="0"/>
+              <a:t>Thanks!</a:t>
+            </a:r>
+          </a:p>
+          <a:p>
+            <a:endParaRPr lang="en-US" dirty="0"/>
+          </a:p>
+          <a:p>
+            <a:r>
+              <a:rPr lang="en-US" dirty="0"/>
+              <a:t>1. 2015-2016 FTC Kickoff Animation 	</a:t>
+            </a:r>
+            <a:r>
+              <a:rPr lang="en-US" dirty="0" smtClean="0"/>
+              <a:t>https</a:t>
+            </a:r>
+            <a:r>
+              <a:rPr lang="en-US" dirty="0"/>
+              <a:t>://youtu.be/b49Q3kqrSv0?t=2m35s</a:t>
+            </a:r>
+          </a:p>
+          <a:p>
+            <a:r>
+              <a:rPr lang="en-US" dirty="0"/>
+              <a:t>2. FTC 7462 at 2 weeks to go		</a:t>
+            </a:r>
+            <a:r>
+              <a:rPr lang="en-US" dirty="0" smtClean="0"/>
+              <a:t>https</a:t>
+            </a:r>
+            <a:r>
+              <a:rPr lang="en-US" dirty="0"/>
+              <a:t>://www.youtube.com/watch?v=GfBsNbdajuo&amp;t=25s</a:t>
+            </a:r>
+          </a:p>
+          <a:p>
+            <a:r>
+              <a:rPr lang="en-US" dirty="0"/>
+              <a:t>3. Ingraham Robotics Jan 16 2016	</a:t>
+            </a:r>
+            <a:r>
+              <a:rPr lang="en-US" dirty="0" smtClean="0"/>
+              <a:t>https</a:t>
+            </a:r>
+            <a:r>
+              <a:rPr lang="en-US" dirty="0"/>
+              <a:t>://www.youtube.com/watch?v=nlPdtDNPGpE</a:t>
+            </a:r>
+          </a:p>
+          <a:p>
+            <a:r>
+              <a:rPr lang="en-US" dirty="0"/>
+              <a:t>3a. FTC 7462 WA State Championship 2016	</a:t>
+            </a:r>
+            <a:r>
+              <a:rPr lang="en-US" dirty="0" smtClean="0"/>
+              <a:t>https</a:t>
+            </a:r>
+            <a:r>
+              <a:rPr lang="en-US" dirty="0"/>
+              <a:t>://www.youtube.com/watch?v=kBjMV7yCUiw</a:t>
+            </a:r>
+          </a:p>
+          <a:p>
+            <a:r>
+              <a:rPr lang="en-US" dirty="0"/>
+              <a:t>4. FIRST STRONGHOLD Game Reveal	</a:t>
+            </a:r>
+            <a:r>
+              <a:rPr lang="en-US" dirty="0" smtClean="0"/>
+              <a:t>https</a:t>
+            </a:r>
+            <a:r>
+              <a:rPr lang="en-US" dirty="0"/>
+              <a:t>://www.youtube.com/watch?v=VqOKzoHJDjA</a:t>
+            </a:r>
+          </a:p>
+          <a:p>
+            <a:r>
+              <a:rPr lang="en-US" dirty="0"/>
+              <a:t>5. FRC 4030 Stronghold Jan24 2015	</a:t>
+            </a:r>
+            <a:r>
+              <a:rPr lang="en-US" dirty="0" smtClean="0"/>
+              <a:t>https</a:t>
+            </a:r>
+            <a:r>
+              <a:rPr lang="en-US" dirty="0"/>
+              <a:t>://www.youtube.com/watch?v=_8ZLAW7W7r4</a:t>
+            </a:r>
+          </a:p>
+          <a:p>
+            <a:r>
+              <a:rPr lang="en-US" dirty="0"/>
+              <a:t>6. FRC 4030 Stronghold Mar 5		</a:t>
+            </a:r>
+            <a:r>
+              <a:rPr lang="en-US" dirty="0" smtClean="0"/>
+              <a:t>https</a:t>
+            </a:r>
+            <a:r>
+              <a:rPr lang="en-US" dirty="0"/>
+              <a:t>://www.youtube.com/watch?v=WEyePh4JqQE</a:t>
+            </a:r>
+          </a:p>
+          <a:p>
+            <a:r>
+              <a:rPr lang="en-US" dirty="0"/>
+              <a:t>7. 2016 PNW FRC Glacier Peak </a:t>
+            </a:r>
+            <a:r>
+              <a:rPr lang="en-US" dirty="0" smtClean="0"/>
+              <a:t>Highlights	https</a:t>
+            </a:r>
+            <a:r>
+              <a:rPr lang="en-US" dirty="0"/>
+              <a:t>://www.youtube.com/watch?v=zqBOouMhyBc&amp;index=2&amp;list=PLwES-SbpsnxyykXlePasPcTTSQGYLGOtP</a:t>
+            </a:r>
+          </a:p>
+          <a:p>
+            <a:endParaRPr lang="en-US" dirty="0"/>
+          </a:p>
+        </p:txBody>
+      </p:sp>
+    </p:spTree>
+    <p:extLst>
+      <p:ext uri="{BB962C8B-B14F-4D97-AF65-F5344CB8AC3E}">
+        <p14:creationId xmlns:p14="http://schemas.microsoft.com/office/powerpoint/2010/main" val="4169659056"/>
+      </p:ext>
+    </p:extLst>
+  </p:cSld>
+  <p:clrMapOvr>
+    <a:masterClrMapping/>
+  </p:clrMapOvr>
 </p:sld>
 </file>
 

</xml_diff>